<commit_message>
Updated as per review comments.
</commit_message>
<xml_diff>
--- a/Android 101.pptx
+++ b/Android 101.pptx
@@ -5822,11 +5822,7 @@
           <a:p>
             <a:r>
               <a:rPr lang="en-US" dirty="0" smtClean="0"/>
-              <a:t>Similar </a:t>
-            </a:r>
-            <a:r>
-              <a:rPr lang="en-US" dirty="0" smtClean="0"/>
-              <a:t>to a Use Case.</a:t>
+              <a:t>Similar to a Use Case.</a:t>
             </a:r>
           </a:p>
           <a:p>
@@ -5953,11 +5949,7 @@
           <a:p>
             <a:r>
               <a:rPr lang="en-US" dirty="0" smtClean="0"/>
-              <a:t>No </a:t>
-            </a:r>
-            <a:r>
-              <a:rPr lang="en-US" dirty="0" smtClean="0"/>
-              <a:t>Visual interface</a:t>
+              <a:t>No Visual interface</a:t>
             </a:r>
           </a:p>
           <a:p>
@@ -6064,11 +6056,7 @@
           <a:p>
             <a:r>
               <a:rPr lang="en-US" dirty="0" smtClean="0"/>
-              <a:t>Extend </a:t>
-            </a:r>
-            <a:r>
-              <a:rPr lang="en-US" dirty="0" smtClean="0"/>
-              <a:t>the class </a:t>
+              <a:t>Extend the class </a:t>
             </a:r>
             <a:r>
               <a:rPr lang="en-US" dirty="0" err="1" smtClean="0"/>
@@ -6182,11 +6170,7 @@
           <a:p>
             <a:r>
               <a:rPr lang="en-US" dirty="0" smtClean="0"/>
-              <a:t>Used </a:t>
-            </a:r>
-            <a:r>
-              <a:rPr lang="en-US" dirty="0" smtClean="0"/>
-              <a:t>to interchange data between different Applications</a:t>
+              <a:t>Used to interchange data between different Applications</a:t>
             </a:r>
           </a:p>
           <a:p>
@@ -6290,19 +6274,15 @@
           <a:p>
             <a:r>
               <a:rPr lang="en-US" dirty="0" smtClean="0"/>
-              <a:t>An </a:t>
-            </a:r>
-            <a:r>
-              <a:rPr lang="en-US" dirty="0" smtClean="0"/>
-              <a:t>Intent to start either an Activity, Service or </a:t>
-            </a:r>
-            <a:r>
-              <a:rPr lang="en-US" dirty="0" err="1" smtClean="0"/>
-              <a:t>Braodcast</a:t>
-            </a:r>
-            <a:r>
-              <a:rPr lang="en-US" dirty="0" smtClean="0"/>
-              <a:t> Receiver</a:t>
+              <a:t>An Intent to start either an Activity, Service or </a:t>
+            </a:r>
+            <a:r>
+              <a:rPr lang="en-US" dirty="0" smtClean="0"/>
+              <a:t>Broadcast </a:t>
+            </a:r>
+            <a:r>
+              <a:rPr lang="en-US" dirty="0" smtClean="0"/>
+              <a:t>Receiver</a:t>
             </a:r>
           </a:p>
           <a:p>
@@ -6398,11 +6378,7 @@
           <a:p>
             <a:r>
               <a:rPr lang="en-US" dirty="0" smtClean="0"/>
-              <a:t>Package </a:t>
-            </a:r>
-            <a:r>
-              <a:rPr lang="en-US" dirty="0" smtClean="0"/>
-              <a:t>and Version</a:t>
+              <a:t>Package and Version</a:t>
             </a:r>
           </a:p>
           <a:p>
@@ -7176,11 +7152,7 @@
             </a:pPr>
             <a:r>
               <a:rPr lang="en-US" dirty="0" smtClean="0"/>
-              <a:t>Confucius </a:t>
-            </a:r>
-            <a:r>
-              <a:rPr lang="en-US" dirty="0" smtClean="0"/>
-              <a:t>said….</a:t>
+              <a:t>Confucius said….</a:t>
             </a:r>
           </a:p>
           <a:p>
@@ -7363,29 +7335,13 @@
           <a:p>
             <a:r>
               <a:rPr lang="en-US" dirty="0" smtClean="0"/>
-              <a:t>Create and run another app with </a:t>
-            </a:r>
-            <a:r>
-              <a:rPr lang="en-US" dirty="0" smtClean="0"/>
-              <a:t>simple </a:t>
-            </a:r>
-            <a:r>
-              <a:rPr lang="en-US" dirty="0" smtClean="0"/>
-              <a:t>Graphics</a:t>
-            </a:r>
-          </a:p>
-          <a:p>
-            <a:r>
-              <a:rPr lang="en-US" dirty="0" smtClean="0"/>
-              <a:t>Create and run one more </a:t>
-            </a:r>
-            <a:r>
-              <a:rPr lang="en-US" dirty="0" smtClean="0"/>
-              <a:t>app </a:t>
-            </a:r>
-            <a:r>
-              <a:rPr lang="en-US" dirty="0" smtClean="0"/>
-              <a:t>with Web Service</a:t>
+              <a:t>Create and run another app with simple Graphics</a:t>
+            </a:r>
+          </a:p>
+          <a:p>
+            <a:r>
+              <a:rPr lang="en-US" dirty="0" smtClean="0"/>
+              <a:t>Create and run one more app with Web Service</a:t>
             </a:r>
           </a:p>
         </p:txBody>
@@ -7474,11 +7430,7 @@
           <a:p>
             <a:r>
               <a:rPr lang="en-US" dirty="0" smtClean="0"/>
-              <a:t>Download </a:t>
-            </a:r>
-            <a:r>
-              <a:rPr lang="en-US" dirty="0" smtClean="0"/>
-              <a:t>from </a:t>
+              <a:t>Download from </a:t>
             </a:r>
           </a:p>
           <a:p>
@@ -7486,24 +7438,14 @@
               <a:rPr lang="en-US" dirty="0" smtClean="0">
                 <a:hlinkClick r:id="rId2"/>
               </a:rPr>
-              <a:t>http://</a:t>
-            </a:r>
-            <a:r>
-              <a:rPr lang="en-US" dirty="0" smtClean="0">
-                <a:hlinkClick r:id="rId2"/>
-              </a:rPr>
-              <a:t>developer.android.com/sdk/installing/index.html</a:t>
+              <a:t>http://developer.android.com/sdk/installing/index.html</a:t>
             </a:r>
             <a:endParaRPr lang="en-US" dirty="0" smtClean="0"/>
           </a:p>
           <a:p>
             <a:r>
               <a:rPr lang="en-US" dirty="0" smtClean="0"/>
-              <a:t>It uses Eclipse IDE and its Cool</a:t>
-            </a:r>
-            <a:r>
-              <a:rPr lang="en-US" dirty="0" smtClean="0"/>
-              <a:t>!!!</a:t>
+              <a:t>It uses Eclipse IDE and its Cool!!!</a:t>
             </a:r>
           </a:p>
           <a:p>
@@ -7511,7 +7453,6 @@
               <a:rPr lang="en-US" dirty="0" smtClean="0"/>
               <a:t>Start Eclipse, select Workspace</a:t>
             </a:r>
-            <a:endParaRPr lang="en-US" dirty="0" smtClean="0"/>
           </a:p>
           <a:p>
             <a:pPr>
@@ -8166,17 +8107,8 @@
           <a:p>
             <a:r>
               <a:rPr lang="en-US" dirty="0" smtClean="0"/>
-              <a:t>“An </a:t>
-            </a:r>
-            <a:r>
-              <a:rPr lang="en-US" dirty="0" smtClean="0"/>
-              <a:t>automaton that is created from biological materials and resembles a human. Also called humanoid</a:t>
-            </a:r>
-            <a:r>
-              <a:rPr lang="en-US" dirty="0" smtClean="0"/>
-              <a:t>.”</a:t>
-            </a:r>
-            <a:endParaRPr lang="en-US" dirty="0" smtClean="0"/>
+              <a:t>“An automaton that is created from biological materials and resembles a human. Also called humanoid.”</a:t>
+            </a:r>
           </a:p>
           <a:p>
             <a:r>
@@ -8187,13 +8119,8 @@
           <a:p>
             <a:r>
               <a:rPr lang="en-US" dirty="0" smtClean="0"/>
-              <a:t>Open </a:t>
-            </a:r>
-            <a:r>
-              <a:rPr lang="en-US" dirty="0" smtClean="0"/>
-              <a:t>Source</a:t>
-            </a:r>
-            <a:endParaRPr lang="en-US" dirty="0" smtClean="0"/>
+              <a:t>Open Source</a:t>
+            </a:r>
           </a:p>
           <a:p>
             <a:r>
@@ -9223,7 +9150,9 @@
         </p:nvSpPr>
         <p:spPr/>
         <p:txBody>
-          <a:bodyPr/>
+          <a:bodyPr>
+            <a:normAutofit/>
+          </a:bodyPr>
           <a:lstStyle/>
           <a:p>
             <a:endParaRPr lang="en-US" dirty="0" smtClean="0"/>
@@ -9240,11 +9169,7 @@
           <a:p>
             <a:r>
               <a:rPr lang="en-US" dirty="0" smtClean="0"/>
-              <a:t>And </a:t>
-            </a:r>
-            <a:r>
-              <a:rPr lang="en-US" dirty="0" smtClean="0"/>
-              <a:t>it is also possible to draw images directly which is much easier</a:t>
+              <a:t>And it is also possible to draw images directly which is much easier</a:t>
             </a:r>
           </a:p>
           <a:p>
@@ -9253,8 +9178,8 @@
               <a:t>An </a:t>
             </a:r>
             <a:r>
-              <a:rPr lang="en-US" dirty="0" err="1" smtClean="0"/>
-              <a:t>OnTouchListner</a:t>
+              <a:rPr lang="en-US" smtClean="0"/>
+              <a:t>OnTouchListener</a:t>
             </a:r>
             <a:r>
               <a:rPr lang="en-US" dirty="0" smtClean="0"/>
@@ -9268,13 +9193,8 @@
           <a:p>
             <a:r>
               <a:rPr lang="en-US" dirty="0" smtClean="0"/>
-              <a:t>Often, view needs to be a Thread to update display </a:t>
-            </a:r>
-            <a:r>
-              <a:rPr lang="en-US" dirty="0" smtClean="0"/>
-              <a:t>continuously</a:t>
-            </a:r>
-            <a:endParaRPr lang="en-US" dirty="0" smtClean="0"/>
+              <a:t>Often, view needs to be a Thread to update display continuously</a:t>
+            </a:r>
           </a:p>
           <a:p>
             <a:endParaRPr lang="en-US" dirty="0"/>
@@ -9368,11 +9288,7 @@
           <a:p>
             <a:r>
               <a:rPr lang="en-US" dirty="0" smtClean="0"/>
-              <a:t>Not </a:t>
-            </a:r>
-            <a:r>
-              <a:rPr lang="en-US" dirty="0" smtClean="0"/>
-              <a:t>J2ME extension</a:t>
+              <a:t>Not J2ME extension</a:t>
             </a:r>
           </a:p>
           <a:p>
@@ -9687,13 +9603,7 @@
               <a:rPr lang="en-US" dirty="0" smtClean="0">
                 <a:hlinkClick r:id="rId2"/>
               </a:rPr>
-              <a:t>http</a:t>
-            </a:r>
-            <a:r>
-              <a:rPr lang="en-US" dirty="0" smtClean="0">
-                <a:hlinkClick r:id="rId2"/>
-              </a:rPr>
-              <a:t>://developer.android.com</a:t>
+              <a:t>http://developer.android.com</a:t>
             </a:r>
             <a:endParaRPr lang="en-US" dirty="0" smtClean="0"/>
           </a:p>
@@ -9772,13 +9682,7 @@
               <a:rPr lang="en-US" dirty="0" smtClean="0">
                 <a:hlinkClick r:id="rId4"/>
               </a:rPr>
-              <a:t>http</a:t>
-            </a:r>
-            <a:r>
-              <a:rPr lang="en-US" dirty="0" smtClean="0">
-                <a:hlinkClick r:id="rId4"/>
-              </a:rPr>
-              <a:t>://code.google.com/p/apps-for-android/</a:t>
+              <a:t>http://code.google.com/p/apps-for-android/</a:t>
             </a:r>
             <a:endParaRPr lang="en-US" dirty="0" smtClean="0"/>
           </a:p>
@@ -9816,13 +9720,7 @@
               <a:rPr lang="en-US" dirty="0" smtClean="0">
                 <a:hlinkClick r:id="rId5"/>
               </a:rPr>
-              <a:t>http</a:t>
-            </a:r>
-            <a:r>
-              <a:rPr lang="en-US" dirty="0" smtClean="0">
-                <a:hlinkClick r:id="rId5"/>
-              </a:rPr>
-              <a:t>://www.kantarworldpanel.com/Global/News/While-Android-Leads-iOS-and-Windows-Are-Growing-At-A-Faster-Pace</a:t>
+              <a:t>http://www.kantarworldpanel.com/Global/News/While-Android-Leads-iOS-and-Windows-Are-Growing-At-A-Faster-Pace</a:t>
             </a:r>
             <a:endParaRPr lang="en-US" dirty="0" smtClean="0"/>
           </a:p>
@@ -10101,7 +9999,6 @@
               <a:rPr lang="en-US" dirty="0" smtClean="0"/>
               <a:t>Newness</a:t>
             </a:r>
-            <a:endParaRPr lang="en-US" dirty="0" smtClean="0"/>
           </a:p>
           <a:p>
             <a:r>
@@ -10290,23 +10187,7 @@
           <a:p>
             <a:r>
               <a:rPr lang="en-US" dirty="0" smtClean="0"/>
-              <a:t>Android went ahead of </a:t>
-            </a:r>
-            <a:r>
-              <a:rPr lang="en-US" dirty="0" smtClean="0"/>
-              <a:t>Apple </a:t>
-            </a:r>
-            <a:r>
-              <a:rPr lang="en-US" dirty="0" smtClean="0"/>
-              <a:t>in Apr’13 with 51.7% </a:t>
-            </a:r>
-            <a:r>
-              <a:rPr lang="en-US" dirty="0" smtClean="0"/>
-              <a:t>market </a:t>
-            </a:r>
-            <a:r>
-              <a:rPr lang="en-US" dirty="0" smtClean="0"/>
-              <a:t>Share</a:t>
+              <a:t>Android went ahead of Apple in Apr’13 with 51.7% market Share</a:t>
             </a:r>
           </a:p>
           <a:p>
@@ -10546,7 +10427,18 @@
           <a:p>
             <a:r>
               <a:rPr lang="en-US" dirty="0" smtClean="0"/>
-              <a:t>It recently added full-cycle Android development support in both the free Community Edition and the Ultimate edition</a:t>
+              <a:t>Google will deprecate Eclipse</a:t>
+            </a:r>
+            <a:endParaRPr lang="en-US" dirty="0" smtClean="0"/>
+          </a:p>
+          <a:p>
+            <a:r>
+              <a:rPr lang="en-US" dirty="0" smtClean="0"/>
+              <a:t>It </a:t>
+            </a:r>
+            <a:r>
+              <a:rPr lang="en-US" dirty="0" smtClean="0"/>
+              <a:t>recently added full-cycle Android development support in both the free Community Edition and the Ultimate edition</a:t>
             </a:r>
           </a:p>
           <a:p>

</xml_diff>